<commit_message>
added some files in week 1 regarding opening and jquery intro
</commit_message>
<xml_diff>
--- a/week-1/PHP Basics.pptx
+++ b/week-1/PHP Basics.pptx
@@ -16,9 +16,9 @@
     <p:sldId id="271" r:id="rId10"/>
     <p:sldId id="265" r:id="rId11"/>
     <p:sldId id="272" r:id="rId12"/>
-    <p:sldId id="273" r:id="rId13"/>
-    <p:sldId id="266" r:id="rId14"/>
-    <p:sldId id="274" r:id="rId15"/>
+    <p:sldId id="266" r:id="rId13"/>
+    <p:sldId id="274" r:id="rId14"/>
+    <p:sldId id="273" r:id="rId15"/>
     <p:sldId id="267" r:id="rId16"/>
     <p:sldId id="275" r:id="rId17"/>
     <p:sldId id="279" r:id="rId18"/>
@@ -329,7 +329,7 @@
             <a:fld id="{B139C418-A97D-472F-8DB2-71639DCCDE6D}" type="datetimeFigureOut">
               <a:rPr lang="en-US" smtClean="0"/>
               <a:pPr/>
-              <a:t>7/24/2019</a:t>
+              <a:t>7/26/2019</a:t>
             </a:fld>
             <a:endParaRPr lang="en-US"/>
           </a:p>
@@ -496,7 +496,7 @@
             <a:fld id="{B139C418-A97D-472F-8DB2-71639DCCDE6D}" type="datetimeFigureOut">
               <a:rPr lang="en-US" smtClean="0"/>
               <a:pPr/>
-              <a:t>7/24/2019</a:t>
+              <a:t>7/26/2019</a:t>
             </a:fld>
             <a:endParaRPr lang="en-US"/>
           </a:p>
@@ -673,7 +673,7 @@
             <a:fld id="{B139C418-A97D-472F-8DB2-71639DCCDE6D}" type="datetimeFigureOut">
               <a:rPr lang="en-US" smtClean="0"/>
               <a:pPr/>
-              <a:t>7/24/2019</a:t>
+              <a:t>7/26/2019</a:t>
             </a:fld>
             <a:endParaRPr lang="en-US"/>
           </a:p>
@@ -840,7 +840,7 @@
             <a:fld id="{B139C418-A97D-472F-8DB2-71639DCCDE6D}" type="datetimeFigureOut">
               <a:rPr lang="en-US" smtClean="0"/>
               <a:pPr/>
-              <a:t>7/24/2019</a:t>
+              <a:t>7/26/2019</a:t>
             </a:fld>
             <a:endParaRPr lang="en-US"/>
           </a:p>
@@ -1083,7 +1083,7 @@
             <a:fld id="{B139C418-A97D-472F-8DB2-71639DCCDE6D}" type="datetimeFigureOut">
               <a:rPr lang="en-US" smtClean="0"/>
               <a:pPr/>
-              <a:t>7/24/2019</a:t>
+              <a:t>7/26/2019</a:t>
             </a:fld>
             <a:endParaRPr lang="en-US"/>
           </a:p>
@@ -1368,7 +1368,7 @@
             <a:fld id="{B139C418-A97D-472F-8DB2-71639DCCDE6D}" type="datetimeFigureOut">
               <a:rPr lang="en-US" smtClean="0"/>
               <a:pPr/>
-              <a:t>7/24/2019</a:t>
+              <a:t>7/26/2019</a:t>
             </a:fld>
             <a:endParaRPr lang="en-US"/>
           </a:p>
@@ -1787,7 +1787,7 @@
             <a:fld id="{B139C418-A97D-472F-8DB2-71639DCCDE6D}" type="datetimeFigureOut">
               <a:rPr lang="en-US" smtClean="0"/>
               <a:pPr/>
-              <a:t>7/24/2019</a:t>
+              <a:t>7/26/2019</a:t>
             </a:fld>
             <a:endParaRPr lang="en-US"/>
           </a:p>
@@ -1902,7 +1902,7 @@
             <a:fld id="{B139C418-A97D-472F-8DB2-71639DCCDE6D}" type="datetimeFigureOut">
               <a:rPr lang="en-US" smtClean="0"/>
               <a:pPr/>
-              <a:t>7/24/2019</a:t>
+              <a:t>7/26/2019</a:t>
             </a:fld>
             <a:endParaRPr lang="en-US"/>
           </a:p>
@@ -1994,7 +1994,7 @@
             <a:fld id="{B139C418-A97D-472F-8DB2-71639DCCDE6D}" type="datetimeFigureOut">
               <a:rPr lang="en-US" smtClean="0"/>
               <a:pPr/>
-              <a:t>7/24/2019</a:t>
+              <a:t>7/26/2019</a:t>
             </a:fld>
             <a:endParaRPr lang="en-US"/>
           </a:p>
@@ -2268,7 +2268,7 @@
             <a:fld id="{B139C418-A97D-472F-8DB2-71639DCCDE6D}" type="datetimeFigureOut">
               <a:rPr lang="en-US" smtClean="0"/>
               <a:pPr/>
-              <a:t>7/24/2019</a:t>
+              <a:t>7/26/2019</a:t>
             </a:fld>
             <a:endParaRPr lang="en-US"/>
           </a:p>
@@ -2518,7 +2518,7 @@
             <a:fld id="{B139C418-A97D-472F-8DB2-71639DCCDE6D}" type="datetimeFigureOut">
               <a:rPr lang="en-US" smtClean="0"/>
               <a:pPr/>
-              <a:t>7/24/2019</a:t>
+              <a:t>7/26/2019</a:t>
             </a:fld>
             <a:endParaRPr lang="en-US"/>
           </a:p>
@@ -2728,7 +2728,7 @@
             <a:fld id="{B139C418-A97D-472F-8DB2-71639DCCDE6D}" type="datetimeFigureOut">
               <a:rPr lang="en-US" smtClean="0"/>
               <a:pPr/>
-              <a:t>7/24/2019</a:t>
+              <a:t>7/26/2019</a:t>
             </a:fld>
             <a:endParaRPr lang="en-US"/>
           </a:p>
@@ -3412,108 +3412,6 @@
           <a:p>
             <a:r>
               <a:rPr lang="en-US" dirty="0" smtClean="0"/>
-              <a:t>Why Data types?</a:t>
-            </a:r>
-            <a:endParaRPr lang="en-US" dirty="0"/>
-          </a:p>
-        </p:txBody>
-      </p:sp>
-      <p:sp>
-        <p:nvSpPr>
-          <p:cNvPr id="3" name="Content Placeholder 2"/>
-          <p:cNvSpPr>
-            <a:spLocks noGrp="1"/>
-          </p:cNvSpPr>
-          <p:nvPr>
-            <p:ph idx="1"/>
-          </p:nvPr>
-        </p:nvSpPr>
-        <p:spPr/>
-        <p:txBody>
-          <a:bodyPr>
-            <a:normAutofit fontScale="85000" lnSpcReduction="10000"/>
-          </a:bodyPr>
-          <a:lstStyle/>
-          <a:p>
-            <a:r>
-              <a:rPr lang="en-US" dirty="0"/>
-              <a:t>Data types allow a compiler to allocate the right memory space for a variable, and also let it perform type checking, making sure the program uses the variables correctly per their defined type.</a:t>
-            </a:r>
-          </a:p>
-          <a:p>
-            <a:r>
-              <a:rPr lang="en-US" dirty="0"/>
-              <a:t>In a language like C, variables are statically typed. So you have types like char, short, </a:t>
-            </a:r>
-            <a:r>
-              <a:rPr lang="en-US" dirty="0" err="1"/>
-              <a:t>int</a:t>
-            </a:r>
-            <a:r>
-              <a:rPr lang="en-US" dirty="0"/>
-              <a:t>, float, double, and many more.</a:t>
-            </a:r>
-          </a:p>
-          <a:p>
-            <a:r>
-              <a:rPr lang="en-US" dirty="0"/>
-              <a:t>A char is the smallest addressable unit of memory that can contain one character, and is typically 8 bits in size. A short is at least 16 bits in size, and a long is at least 32-bits.</a:t>
-            </a:r>
-          </a:p>
-          <a:p>
-            <a:endParaRPr lang="en-US" dirty="0"/>
-          </a:p>
-        </p:txBody>
-      </p:sp>
-    </p:spTree>
-  </p:cSld>
-  <p:clrMapOvr>
-    <a:masterClrMapping/>
-  </p:clrMapOvr>
-  <p:timing>
-    <p:tnLst>
-      <p:par>
-        <p:cTn id="1" dur="indefinite" restart="never" nodeType="tmRoot"/>
-      </p:par>
-    </p:tnLst>
-  </p:timing>
-</p:sld>
-</file>
-
-<file path=ppt/slides/slide13.xml><?xml version="1.0" encoding="utf-8"?>
-<p:sld xmlns:a="http://schemas.openxmlformats.org/drawingml/2006/main" xmlns:r="http://schemas.openxmlformats.org/officeDocument/2006/relationships" xmlns:p="http://schemas.openxmlformats.org/presentationml/2006/main">
-  <p:cSld>
-    <p:spTree>
-      <p:nvGrpSpPr>
-        <p:cNvPr id="1" name=""/>
-        <p:cNvGrpSpPr/>
-        <p:nvPr/>
-      </p:nvGrpSpPr>
-      <p:grpSpPr>
-        <a:xfrm>
-          <a:off x="0" y="0"/>
-          <a:ext cx="0" cy="0"/>
-          <a:chOff x="0" y="0"/>
-          <a:chExt cx="0" cy="0"/>
-        </a:xfrm>
-      </p:grpSpPr>
-      <p:sp>
-        <p:nvSpPr>
-          <p:cNvPr id="2" name="Title 1"/>
-          <p:cNvSpPr>
-            <a:spLocks noGrp="1"/>
-          </p:cNvSpPr>
-          <p:nvPr>
-            <p:ph type="title"/>
-          </p:nvPr>
-        </p:nvSpPr>
-        <p:spPr/>
-        <p:txBody>
-          <a:bodyPr/>
-          <a:lstStyle/>
-          <a:p>
-            <a:r>
-              <a:rPr lang="en-US" dirty="0" smtClean="0"/>
               <a:t>Boolean</a:t>
             </a:r>
             <a:endParaRPr lang="en-US" dirty="0"/>
@@ -3600,7 +3498,7 @@
 </p:sld>
 </file>
 
-<file path=ppt/slides/slide14.xml><?xml version="1.0" encoding="utf-8"?>
+<file path=ppt/slides/slide13.xml><?xml version="1.0" encoding="utf-8"?>
 <p:sld xmlns:a="http://schemas.openxmlformats.org/drawingml/2006/main" xmlns:r="http://schemas.openxmlformats.org/officeDocument/2006/relationships" xmlns:p="http://schemas.openxmlformats.org/presentationml/2006/main">
   <p:cSld>
     <p:spTree>
@@ -3688,6 +3586,108 @@
           <a:effectLst/>
         </p:spPr>
       </p:pic>
+    </p:spTree>
+  </p:cSld>
+  <p:clrMapOvr>
+    <a:masterClrMapping/>
+  </p:clrMapOvr>
+  <p:timing>
+    <p:tnLst>
+      <p:par>
+        <p:cTn id="1" dur="indefinite" restart="never" nodeType="tmRoot"/>
+      </p:par>
+    </p:tnLst>
+  </p:timing>
+</p:sld>
+</file>
+
+<file path=ppt/slides/slide14.xml><?xml version="1.0" encoding="utf-8"?>
+<p:sld xmlns:a="http://schemas.openxmlformats.org/drawingml/2006/main" xmlns:r="http://schemas.openxmlformats.org/officeDocument/2006/relationships" xmlns:p="http://schemas.openxmlformats.org/presentationml/2006/main">
+  <p:cSld>
+    <p:spTree>
+      <p:nvGrpSpPr>
+        <p:cNvPr id="1" name=""/>
+        <p:cNvGrpSpPr/>
+        <p:nvPr/>
+      </p:nvGrpSpPr>
+      <p:grpSpPr>
+        <a:xfrm>
+          <a:off x="0" y="0"/>
+          <a:ext cx="0" cy="0"/>
+          <a:chOff x="0" y="0"/>
+          <a:chExt cx="0" cy="0"/>
+        </a:xfrm>
+      </p:grpSpPr>
+      <p:sp>
+        <p:nvSpPr>
+          <p:cNvPr id="2" name="Title 1"/>
+          <p:cNvSpPr>
+            <a:spLocks noGrp="1"/>
+          </p:cNvSpPr>
+          <p:nvPr>
+            <p:ph type="title"/>
+          </p:nvPr>
+        </p:nvSpPr>
+        <p:spPr/>
+        <p:txBody>
+          <a:bodyPr/>
+          <a:lstStyle/>
+          <a:p>
+            <a:r>
+              <a:rPr lang="en-US" dirty="0" smtClean="0"/>
+              <a:t>Why Data types?</a:t>
+            </a:r>
+            <a:endParaRPr lang="en-US" dirty="0"/>
+          </a:p>
+        </p:txBody>
+      </p:sp>
+      <p:sp>
+        <p:nvSpPr>
+          <p:cNvPr id="3" name="Content Placeholder 2"/>
+          <p:cNvSpPr>
+            <a:spLocks noGrp="1"/>
+          </p:cNvSpPr>
+          <p:nvPr>
+            <p:ph idx="1"/>
+          </p:nvPr>
+        </p:nvSpPr>
+        <p:spPr/>
+        <p:txBody>
+          <a:bodyPr>
+            <a:normAutofit fontScale="85000" lnSpcReduction="10000"/>
+          </a:bodyPr>
+          <a:lstStyle/>
+          <a:p>
+            <a:r>
+              <a:rPr lang="en-US" dirty="0"/>
+              <a:t>Data types allow a compiler to allocate the right memory space for a variable, and also let it perform type checking, making sure the program uses the variables correctly per their defined type.</a:t>
+            </a:r>
+          </a:p>
+          <a:p>
+            <a:r>
+              <a:rPr lang="en-US" dirty="0"/>
+              <a:t>In a language like C, variables are statically typed. So you have types like char, short, </a:t>
+            </a:r>
+            <a:r>
+              <a:rPr lang="en-US" dirty="0" err="1"/>
+              <a:t>int</a:t>
+            </a:r>
+            <a:r>
+              <a:rPr lang="en-US" dirty="0"/>
+              <a:t>, float, double, and many more.</a:t>
+            </a:r>
+          </a:p>
+          <a:p>
+            <a:r>
+              <a:rPr lang="en-US" dirty="0"/>
+              <a:t>A char is the smallest addressable unit of memory that can contain one character, and is typically 8 bits in size. A short is at least 16 bits in size, and a long is at least 32-bits.</a:t>
+            </a:r>
+          </a:p>
+          <a:p>
+            <a:endParaRPr lang="en-US" dirty="0"/>
+          </a:p>
+        </p:txBody>
+      </p:sp>
     </p:spTree>
   </p:cSld>
   <p:clrMapOvr>
@@ -4877,19 +4877,7 @@
             </a:r>
             <a:r>
               <a:rPr lang="en-US" dirty="0" smtClean="0"/>
-              <a:t> a function has a GLOBAL SCOPE and can only be accessed </a:t>
-            </a:r>
-            <a:r>
-              <a:rPr lang="en-US" dirty="0" smtClean="0"/>
-              <a:t>outside </a:t>
-            </a:r>
-            <a:r>
-              <a:rPr lang="en-US" dirty="0" smtClean="0"/>
-              <a:t>a </a:t>
-            </a:r>
-            <a:r>
-              <a:rPr lang="en-US" dirty="0" smtClean="0"/>
-              <a:t>function:</a:t>
+              <a:t> a function has a GLOBAL SCOPE and can only be accessed outside a function:</a:t>
             </a:r>
           </a:p>
           <a:p>
@@ -5566,20 +5554,14 @@
             <a:pPr lvl="1"/>
             <a:r>
               <a:rPr lang="en-US" dirty="0" smtClean="0"/>
-              <a:t>Use a function to print each results.</a:t>
-            </a:r>
-            <a:r>
-              <a:rPr lang="en-US" dirty="0" smtClean="0"/>
-              <a:t> </a:t>
-            </a:r>
-            <a:endParaRPr lang="en-US" dirty="0" smtClean="0"/>
+              <a:t>Use a function to print each results. </a:t>
+            </a:r>
           </a:p>
           <a:p>
             <a:r>
               <a:rPr lang="en-US" dirty="0" smtClean="0"/>
               <a:t>Static Scoping:</a:t>
             </a:r>
-            <a:endParaRPr lang="en-US" dirty="0" smtClean="0"/>
           </a:p>
           <a:p>
             <a:pPr lvl="1"/>
@@ -5594,7 +5576,6 @@
               <a:rPr lang="en-US" dirty="0" smtClean="0"/>
               <a:t>Multiply them 2 times and print each result</a:t>
             </a:r>
-            <a:endParaRPr lang="en-US" dirty="0" smtClean="0"/>
           </a:p>
           <a:p>
             <a:pPr lvl="1"/>
@@ -5840,19 +5821,7 @@
             </a:br>
             <a:r>
               <a:rPr lang="en-US" sz="2000" dirty="0" smtClean="0"/>
-              <a:t>   echo </a:t>
-            </a:r>
-            <a:r>
-              <a:rPr lang="en-US" sz="2000" dirty="0" smtClean="0"/>
-              <a:t>"&lt;p&gt;Copyright &amp;copy; 1999-" . date("Y") . </a:t>
-            </a:r>
-            <a:r>
-              <a:rPr lang="en-US" sz="2000" dirty="0" smtClean="0"/>
-              <a:t>" W3Schools.com</a:t>
-            </a:r>
-            <a:r>
-              <a:rPr lang="en-US" sz="2000" dirty="0" smtClean="0"/>
-              <a:t>&lt;/p&gt;";</a:t>
+              <a:t>   echo "&lt;p&gt;Copyright &amp;copy; 1999-" . date("Y") . " W3Schools.com&lt;/p&gt;";</a:t>
             </a:r>
             <a:br>
               <a:rPr lang="en-US" sz="2000" dirty="0" smtClean="0"/>
@@ -6227,11 +6196,7 @@
           <a:p>
             <a:r>
               <a:rPr lang="en-US" dirty="0" smtClean="0"/>
-              <a:t>Control Loops and </a:t>
-            </a:r>
-            <a:r>
-              <a:rPr lang="en-US" dirty="0" smtClean="0"/>
-              <a:t>Conditional Statements</a:t>
+              <a:t>Control Loops and Conditional Statements</a:t>
             </a:r>
             <a:br>
               <a:rPr lang="en-US" dirty="0" smtClean="0"/>

</xml_diff>